<commit_message>
Add Creational Patterns exercises README
</commit_message>
<xml_diff>
--- a/Lesson.03 - Design Patterns - Structural/Structural.pptx
+++ b/Lesson.03 - Design Patterns - Structural/Structural.pptx
@@ -153,70 +153,6 @@
 </p188:authorLst>
 </file>
 
-<file path=ppt/comments/modernComment_10A_717B28E0.xml><?xml version="1.0" encoding="utf-8"?>
-<p188:cmLst xmlns:a="http://schemas.openxmlformats.org/drawingml/2006/main" xmlns:r="http://schemas.openxmlformats.org/officeDocument/2006/relationships" xmlns:p188="http://schemas.microsoft.com/office/powerpoint/2018/8/main">
-  <p188:cm id="{715FB622-B9A2-8343-8D78-A21A0E4E186E}" authorId="{9B3E8C50-9F58-5237-7C41-C721E3BAA428}" created="2025-03-01T13:49:37.431">
-    <ac:deMkLst xmlns:ac="http://schemas.microsoft.com/office/drawing/2013/main/command">
-      <pc:docMk xmlns:pc="http://schemas.microsoft.com/office/powerpoint/2013/main/command"/>
-      <pc:sldMk xmlns:pc="http://schemas.microsoft.com/office/powerpoint/2013/main/command" cId="1903896800" sldId="266"/>
-      <ac:spMk id="5" creationId="{BF90E352-029C-5278-6B4A-599656F53D1C}"/>
-    </ac:deMkLst>
-    <p188:txBody>
-      <a:bodyPr/>
-      <a:lstStyle/>
-      <a:p>
-        <a:r>
-          <a:rPr lang="en-US"/>
-          <a:t>A problem can always be fixed with another level of indirection</a:t>
-        </a:r>
-      </a:p>
-    </p188:txBody>
-  </p188:cm>
-</p188:cmLst>
-</file>
-
-<file path=ppt/comments/modernComment_118_252AC312.xml><?xml version="1.0" encoding="utf-8"?>
-<p188:cmLst xmlns:a="http://schemas.openxmlformats.org/drawingml/2006/main" xmlns:r="http://schemas.openxmlformats.org/officeDocument/2006/relationships" xmlns:p188="http://schemas.microsoft.com/office/powerpoint/2018/8/main">
-  <p188:cm id="{CB896355-80D9-3E47-BA00-2142A0468C61}" authorId="{9B3E8C50-9F58-5237-7C41-C721E3BAA428}" created="2025-03-02T19:29:22.714">
-    <pc:sldMkLst xmlns:pc="http://schemas.microsoft.com/office/powerpoint/2013/main/command">
-      <pc:docMk/>
-      <pc:sldMk cId="623559442" sldId="277"/>
-    </pc:sldMkLst>
-    <p188:txBody>
-      <a:bodyPr/>
-      <a:lstStyle/>
-      <a:p>
-        <a:r>
-          <a:rPr lang="en-US"/>
-          <a:t>Watch out for the parent reference!</a:t>
-        </a:r>
-      </a:p>
-    </p188:txBody>
-  </p188:cm>
-</p188:cmLst>
-</file>
-
-<file path=ppt/comments/modernComment_11B_C78F68EC.xml><?xml version="1.0" encoding="utf-8"?>
-<p188:cmLst xmlns:a="http://schemas.openxmlformats.org/drawingml/2006/main" xmlns:r="http://schemas.openxmlformats.org/officeDocument/2006/relationships" xmlns:p188="http://schemas.microsoft.com/office/powerpoint/2018/8/main">
-  <p188:cm id="{05A4C37C-1ECE-8A4A-8A55-AF16B8E71512}" authorId="{9B3E8C50-9F58-5237-7C41-C721E3BAA428}" created="2025-03-03T21:05:21.253">
-    <pc:sldMkLst xmlns:pc="http://schemas.microsoft.com/office/powerpoint/2013/main/command">
-      <pc:docMk/>
-      <pc:sldMk cId="3348064492" sldId="279"/>
-    </pc:sldMkLst>
-    <p188:txBody>
-      <a:bodyPr/>
-      <a:lstStyle/>
-      <a:p>
-        <a:r>
-          <a:rPr lang="en-US"/>
-          <a:t>Can we decorate the first solution?</a:t>
-        </a:r>
-      </a:p>
-    </p188:txBody>
-  </p188:cm>
-</p188:cmLst>
-</file>
-
 <file path=ppt/handoutMasters/handoutMaster1.xml><?xml version="1.0" encoding="utf-8"?>
 <p:handoutMaster xmlns:a="http://schemas.openxmlformats.org/drawingml/2006/main" xmlns:r="http://schemas.openxmlformats.org/officeDocument/2006/relationships" xmlns:p="http://schemas.openxmlformats.org/presentationml/2006/main">
   <p:cSld>
@@ -314,7 +250,7 @@
           <a:p>
             <a:fld id="{14042657-6240-B14B-9F48-F865CB79AC7C}" type="datetimeFigureOut">
               <a:rPr lang="en-US" smtClean="0"/>
-              <a:t>9/27/25</a:t>
+              <a:t>10/8/25</a:t>
             </a:fld>
             <a:endParaRPr lang="en-US"/>
           </a:p>
@@ -498,7 +434,7 @@
           <a:p>
             <a:fld id="{5E6B121A-761B-2742-9D61-65348EACD743}" type="datetimeFigureOut">
               <a:rPr lang="en-US" smtClean="0"/>
-              <a:t>9/27/25</a:t>
+              <a:t>10/8/25</a:t>
             </a:fld>
             <a:endParaRPr lang="en-US"/>
           </a:p>
@@ -813,6 +749,95 @@
           <a:bodyPr/>
           <a:lstStyle/>
           <a:p>
+            <a:pPr marL="0" marR="0" lvl="0" indent="0" algn="l" defTabSz="914400" rtl="0" eaLnBrk="1" fontAlgn="auto" latinLnBrk="0" hangingPunct="1">
+              <a:lnSpc>
+                <a:spcPct val="100000"/>
+              </a:lnSpc>
+              <a:spcBef>
+                <a:spcPts val="0"/>
+              </a:spcBef>
+              <a:spcAft>
+                <a:spcPts val="0"/>
+              </a:spcAft>
+              <a:buClrTx/>
+              <a:buSzTx/>
+              <a:buFontTx/>
+              <a:buNone/>
+              <a:tabLst/>
+              <a:defRPr/>
+            </a:pPr>
+            <a:r>
+              <a:rPr lang="en-US" sz="1200" kern="1200">
+                <a:solidFill>
+                  <a:schemeClr val="tx1"/>
+                </a:solidFill>
+                <a:effectLst/>
+                <a:latin typeface="+mn-lt"/>
+                <a:ea typeface="+mn-ea"/>
+                <a:cs typeface="+mn-cs"/>
+              </a:rPr>
+              <a:t>A problem can always be fixed with another level of indirection</a:t>
+            </a:r>
+          </a:p>
+        </p:txBody>
+      </p:sp>
+    </p:spTree>
+    <p:extLst>
+      <p:ext uri="{BB962C8B-B14F-4D97-AF65-F5344CB8AC3E}">
+        <p14:creationId xmlns:p14="http://schemas.microsoft.com/office/powerpoint/2010/main" val="3247554858"/>
+      </p:ext>
+    </p:extLst>
+  </p:cSld>
+  <p:clrMapOvr>
+    <a:masterClrMapping/>
+  </p:clrMapOvr>
+</p:notes>
+</file>
+
+<file path=ppt/notesSlides/notesSlide2.xml><?xml version="1.0" encoding="utf-8"?>
+<p:notes xmlns:a="http://schemas.openxmlformats.org/drawingml/2006/main" xmlns:r="http://schemas.openxmlformats.org/officeDocument/2006/relationships" xmlns:p="http://schemas.openxmlformats.org/presentationml/2006/main">
+  <p:cSld>
+    <p:spTree>
+      <p:nvGrpSpPr>
+        <p:cNvPr id="1" name=""/>
+        <p:cNvGrpSpPr/>
+        <p:nvPr/>
+      </p:nvGrpSpPr>
+      <p:grpSpPr>
+        <a:xfrm>
+          <a:off x="0" y="0"/>
+          <a:ext cx="0" cy="0"/>
+          <a:chOff x="0" y="0"/>
+          <a:chExt cx="0" cy="0"/>
+        </a:xfrm>
+      </p:grpSpPr>
+      <p:sp>
+        <p:nvSpPr>
+          <p:cNvPr id="2" name="Slide Image Placeholder 1"/>
+          <p:cNvSpPr>
+            <a:spLocks noGrp="1" noRot="1" noChangeAspect="1"/>
+          </p:cNvSpPr>
+          <p:nvPr>
+            <p:ph type="sldImg"/>
+          </p:nvPr>
+        </p:nvSpPr>
+        <p:spPr/>
+      </p:sp>
+      <p:sp>
+        <p:nvSpPr>
+          <p:cNvPr id="3" name="Notes Placeholder 2"/>
+          <p:cNvSpPr>
+            <a:spLocks noGrp="1"/>
+          </p:cNvSpPr>
+          <p:nvPr>
+            <p:ph type="body" idx="1"/>
+          </p:nvPr>
+        </p:nvSpPr>
+        <p:spPr/>
+        <p:txBody>
+          <a:bodyPr/>
+          <a:lstStyle/>
+          <a:p>
             <a:endParaRPr lang="en-US"/>
           </a:p>
         </p:txBody>
@@ -830,7 +855,7 @@
 </p:notes>
 </file>
 
-<file path=ppt/notesSlides/notesSlide2.xml><?xml version="1.0" encoding="utf-8"?>
+<file path=ppt/notesSlides/notesSlide3.xml><?xml version="1.0" encoding="utf-8"?>
 <p:notes xmlns:a="http://schemas.openxmlformats.org/drawingml/2006/main" xmlns:r="http://schemas.openxmlformats.org/officeDocument/2006/relationships" xmlns:p="http://schemas.openxmlformats.org/presentationml/2006/main">
   <p:cSld>
     <p:spTree>
@@ -892,7 +917,10 @@
           <a:bodyPr/>
           <a:lstStyle/>
           <a:p>
-            <a:endParaRPr lang="en-US"/>
+            <a:r>
+              <a:rPr lang="en-US"/>
+              <a:t>Watch out for the parent reference!</a:t>
+            </a:r>
           </a:p>
         </p:txBody>
       </p:sp>
@@ -909,7 +937,7 @@
 </p:notes>
 </file>
 
-<file path=ppt/notesSlides/notesSlide3.xml><?xml version="1.0" encoding="utf-8"?>
+<file path=ppt/notesSlides/notesSlide4.xml><?xml version="1.0" encoding="utf-8"?>
 <p:notes xmlns:a="http://schemas.openxmlformats.org/drawingml/2006/main" xmlns:r="http://schemas.openxmlformats.org/officeDocument/2006/relationships" xmlns:p="http://schemas.openxmlformats.org/presentationml/2006/main">
   <p:cSld>
     <p:spTree>
@@ -988,7 +1016,7 @@
 </p:notes>
 </file>
 
-<file path=ppt/notesSlides/notesSlide4.xml><?xml version="1.0" encoding="utf-8"?>
+<file path=ppt/notesSlides/notesSlide5.xml><?xml version="1.0" encoding="utf-8"?>
 <p:notes xmlns:a="http://schemas.openxmlformats.org/drawingml/2006/main" xmlns:r="http://schemas.openxmlformats.org/officeDocument/2006/relationships" xmlns:p="http://schemas.openxmlformats.org/presentationml/2006/main">
   <p:cSld>
     <p:spTree>
@@ -1050,7 +1078,35 @@
           <a:bodyPr/>
           <a:lstStyle/>
           <a:p>
-            <a:endParaRPr lang="en-US"/>
+            <a:pPr marL="0" marR="0" lvl="0" indent="0" algn="l" defTabSz="914400" rtl="0" eaLnBrk="1" fontAlgn="auto" latinLnBrk="0" hangingPunct="1">
+              <a:lnSpc>
+                <a:spcPct val="100000"/>
+              </a:lnSpc>
+              <a:spcBef>
+                <a:spcPts val="0"/>
+              </a:spcBef>
+              <a:spcAft>
+                <a:spcPts val="0"/>
+              </a:spcAft>
+              <a:buClrTx/>
+              <a:buSzTx/>
+              <a:buFontTx/>
+              <a:buNone/>
+              <a:tabLst/>
+              <a:defRPr/>
+            </a:pPr>
+            <a:r>
+              <a:rPr lang="en-US" sz="1200" kern="1200">
+                <a:solidFill>
+                  <a:schemeClr val="tx1"/>
+                </a:solidFill>
+                <a:effectLst/>
+                <a:latin typeface="+mn-lt"/>
+                <a:ea typeface="+mn-ea"/>
+                <a:cs typeface="+mn-cs"/>
+              </a:rPr>
+              <a:t>Can we decorate the first solution?</a:t>
+            </a:r>
           </a:p>
         </p:txBody>
       </p:sp>
@@ -1067,7 +1123,7 @@
 </p:notes>
 </file>
 
-<file path=ppt/notesSlides/notesSlide5.xml><?xml version="1.0" encoding="utf-8"?>
+<file path=ppt/notesSlides/notesSlide6.xml><?xml version="1.0" encoding="utf-8"?>
 <p:notes xmlns:a="http://schemas.openxmlformats.org/drawingml/2006/main" xmlns:r="http://schemas.openxmlformats.org/officeDocument/2006/relationships" xmlns:p="http://schemas.openxmlformats.org/presentationml/2006/main">
   <p:cSld>
     <p:spTree>
@@ -1292,7 +1348,7 @@
           <a:lstStyle/>
           <a:p>
             <a:fld id="{D2C0EB8F-2DA2-9E46-B3F8-DE3060D9A026}" type="datetime1">
-              <a:t>9/27/25</a:t>
+              <a:t>10/8/25</a:t>
             </a:fld>
             <a:endParaRPr lang="en-US"/>
           </a:p>
@@ -1492,7 +1548,7 @@
           <a:lstStyle/>
           <a:p>
             <a:fld id="{556A6DE6-3E81-2840-AEAD-026E6225A972}" type="datetime1">
-              <a:t>9/27/25</a:t>
+              <a:t>10/8/25</a:t>
             </a:fld>
             <a:endParaRPr lang="en-US"/>
           </a:p>
@@ -1702,7 +1758,7 @@
           <a:lstStyle/>
           <a:p>
             <a:fld id="{FD19A5EB-7156-2C4C-9402-D7449F1DFE5E}" type="datetime1">
-              <a:t>9/27/25</a:t>
+              <a:t>10/8/25</a:t>
             </a:fld>
             <a:endParaRPr lang="en-US"/>
           </a:p>
@@ -1902,7 +1958,7 @@
           <a:lstStyle/>
           <a:p>
             <a:fld id="{105FE273-68A7-FC4B-AAE0-59FF7E1C9D50}" type="datetime1">
-              <a:t>9/27/25</a:t>
+              <a:t>10/8/25</a:t>
             </a:fld>
             <a:endParaRPr lang="en-US"/>
           </a:p>
@@ -2179,7 +2235,7 @@
           <a:lstStyle/>
           <a:p>
             <a:fld id="{3953863D-357A-2C48-B832-AFFDDAE09C4D}" type="datetime1">
-              <a:t>9/27/25</a:t>
+              <a:t>10/8/25</a:t>
             </a:fld>
             <a:endParaRPr lang="en-US"/>
           </a:p>
@@ -2446,7 +2502,7 @@
           <a:lstStyle/>
           <a:p>
             <a:fld id="{9B384727-DC39-1F4F-AFDF-750A61B12A22}" type="datetime1">
-              <a:t>9/27/25</a:t>
+              <a:t>10/8/25</a:t>
             </a:fld>
             <a:endParaRPr lang="en-US"/>
           </a:p>
@@ -2860,7 +2916,7 @@
           <a:lstStyle/>
           <a:p>
             <a:fld id="{9C191E7F-DEE6-484A-A82C-BAFF244F7279}" type="datetime1">
-              <a:t>9/27/25</a:t>
+              <a:t>10/8/25</a:t>
             </a:fld>
             <a:endParaRPr lang="en-US"/>
           </a:p>
@@ -3003,7 +3059,7 @@
           <a:lstStyle/>
           <a:p>
             <a:fld id="{28729F24-D603-3E4E-B9DD-B204C7317137}" type="datetime1">
-              <a:t>9/27/25</a:t>
+              <a:t>10/8/25</a:t>
             </a:fld>
             <a:endParaRPr lang="en-US"/>
           </a:p>
@@ -3118,7 +3174,7 @@
           <a:lstStyle/>
           <a:p>
             <a:fld id="{653182AB-9B14-5F4A-B96C-4542C0609F01}" type="datetime1">
-              <a:t>9/27/25</a:t>
+              <a:t>10/8/25</a:t>
             </a:fld>
             <a:endParaRPr lang="en-US"/>
           </a:p>
@@ -3431,7 +3487,7 @@
           <a:lstStyle/>
           <a:p>
             <a:fld id="{E06CFFB9-FD44-0143-82C5-319D18BA6C1A}" type="datetime1">
-              <a:t>9/27/25</a:t>
+              <a:t>10/8/25</a:t>
             </a:fld>
             <a:endParaRPr lang="en-US"/>
           </a:p>
@@ -3721,7 +3777,7 @@
           <a:lstStyle/>
           <a:p>
             <a:fld id="{AD378748-6546-7942-AB14-9B6D53E5D93C}" type="datetime1">
-              <a:t>9/27/25</a:t>
+              <a:t>10/8/25</a:t>
             </a:fld>
             <a:endParaRPr lang="en-US"/>
           </a:p>
@@ -3964,7 +4020,7 @@
           </a:lstStyle>
           <a:p>
             <a:fld id="{B8C141C7-3FAC-3945-B604-870AABF28252}" type="datetime1">
-              <a:t>9/27/25</a:t>
+              <a:t>10/8/25</a:t>
             </a:fld>
             <a:endParaRPr lang="en-US"/>
           </a:p>
@@ -10229,11 +10285,6 @@
   <p:clrMapOvr>
     <a:masterClrMapping/>
   </p:clrMapOvr>
-  <p:extLst>
-    <p:ext uri="{6950BFC3-D8DA-4A85-94F7-54DA5524770B}">
-      <p188:commentRel xmlns:p188="http://schemas.microsoft.com/office/powerpoint/2018/8/main" r:id="rId3"/>
-    </p:ext>
-  </p:extLst>
 </p:sld>
 </file>
 
@@ -11445,9 +11496,22 @@
                 <a:latin typeface="Courier New" panose="02070309020205020404" pitchFamily="49" charset="0"/>
                 <a:cs typeface="Courier New" panose="02070309020205020404" pitchFamily="49" charset="0"/>
               </a:rPr>
-              <a:t>  map&lt; uid_t, IOffice * &gt; _pool;</a:t>
-            </a:r>
-            <a:endParaRPr lang="en-US" sz="1200" dirty="0">
+              <a:t>  </a:t>
+            </a:r>
+            <a:r>
+              <a:rPr lang="en-US" sz="1200" b="1" dirty="0" err="1">
+                <a:solidFill>
+                  <a:srgbClr val="FF0000"/>
+                </a:solidFill>
+                <a:latin typeface="Courier New" panose="02070309020205020404" pitchFamily="49" charset="0"/>
+                <a:cs typeface="Courier New" panose="02070309020205020404" pitchFamily="49" charset="0"/>
+              </a:rPr>
+              <a:t>map&lt; uid_t, IOffice * &gt; _pool;</a:t>
+            </a:r>
+            <a:endParaRPr lang="en-US" sz="1200" b="1" dirty="0">
+              <a:solidFill>
+                <a:srgbClr val="FF0000"/>
+              </a:solidFill>
               <a:latin typeface="Courier New" panose="02070309020205020404" pitchFamily="49" charset="0"/>
               <a:cs typeface="Courier New" panose="02070309020205020404" pitchFamily="49" charset="0"/>
             </a:endParaRPr>
@@ -14220,11 +14284,6 @@
   <p:clrMapOvr>
     <a:masterClrMapping/>
   </p:clrMapOvr>
-  <p:extLst>
-    <p:ext uri="{6950BFC3-D8DA-4A85-94F7-54DA5524770B}">
-      <p188:commentRel xmlns:p188="http://schemas.microsoft.com/office/powerpoint/2018/8/main" r:id="rId3"/>
-    </p:ext>
-  </p:extLst>
 </p:sld>
 </file>
 
@@ -20724,11 +20783,6 @@
       <p:bldP spid="8" grpId="0" build="p"/>
     </p:bldLst>
   </p:timing>
-  <p:extLst>
-    <p:ext uri="{6950BFC3-D8DA-4A85-94F7-54DA5524770B}">
-      <p188:commentRel xmlns:p188="http://schemas.microsoft.com/office/powerpoint/2018/8/main" r:id="rId2"/>
-    </p:ext>
-  </p:extLst>
 </p:sld>
 </file>
 

</xml_diff>

<commit_message>
Improve the Decorator example
</commit_message>
<xml_diff>
--- a/Lesson.03 - Design Patterns - Structural/Structural.pptx
+++ b/Lesson.03 - Design Patterns - Structural/Structural.pptx
@@ -250,7 +250,7 @@
           <a:p>
             <a:fld id="{14042657-6240-B14B-9F48-F865CB79AC7C}" type="datetimeFigureOut">
               <a:rPr lang="en-US" smtClean="0"/>
-              <a:t>10/8/25</a:t>
+              <a:t>10/19/25</a:t>
             </a:fld>
             <a:endParaRPr lang="en-US"/>
           </a:p>
@@ -434,7 +434,7 @@
           <a:p>
             <a:fld id="{5E6B121A-761B-2742-9D61-65348EACD743}" type="datetimeFigureOut">
               <a:rPr lang="en-US" smtClean="0"/>
-              <a:t>10/8/25</a:t>
+              <a:t>10/19/25</a:t>
             </a:fld>
             <a:endParaRPr lang="en-US"/>
           </a:p>
@@ -1348,7 +1348,7 @@
           <a:lstStyle/>
           <a:p>
             <a:fld id="{D2C0EB8F-2DA2-9E46-B3F8-DE3060D9A026}" type="datetime1">
-              <a:t>10/8/25</a:t>
+              <a:t>10/19/25</a:t>
             </a:fld>
             <a:endParaRPr lang="en-US"/>
           </a:p>
@@ -1548,7 +1548,7 @@
           <a:lstStyle/>
           <a:p>
             <a:fld id="{556A6DE6-3E81-2840-AEAD-026E6225A972}" type="datetime1">
-              <a:t>10/8/25</a:t>
+              <a:t>10/19/25</a:t>
             </a:fld>
             <a:endParaRPr lang="en-US"/>
           </a:p>
@@ -1758,7 +1758,7 @@
           <a:lstStyle/>
           <a:p>
             <a:fld id="{FD19A5EB-7156-2C4C-9402-D7449F1DFE5E}" type="datetime1">
-              <a:t>10/8/25</a:t>
+              <a:t>10/19/25</a:t>
             </a:fld>
             <a:endParaRPr lang="en-US"/>
           </a:p>
@@ -1958,7 +1958,7 @@
           <a:lstStyle/>
           <a:p>
             <a:fld id="{105FE273-68A7-FC4B-AAE0-59FF7E1C9D50}" type="datetime1">
-              <a:t>10/8/25</a:t>
+              <a:t>10/19/25</a:t>
             </a:fld>
             <a:endParaRPr lang="en-US"/>
           </a:p>
@@ -2235,7 +2235,7 @@
           <a:lstStyle/>
           <a:p>
             <a:fld id="{3953863D-357A-2C48-B832-AFFDDAE09C4D}" type="datetime1">
-              <a:t>10/8/25</a:t>
+              <a:t>10/19/25</a:t>
             </a:fld>
             <a:endParaRPr lang="en-US"/>
           </a:p>
@@ -2502,7 +2502,7 @@
           <a:lstStyle/>
           <a:p>
             <a:fld id="{9B384727-DC39-1F4F-AFDF-750A61B12A22}" type="datetime1">
-              <a:t>10/8/25</a:t>
+              <a:t>10/19/25</a:t>
             </a:fld>
             <a:endParaRPr lang="en-US"/>
           </a:p>
@@ -2916,7 +2916,7 @@
           <a:lstStyle/>
           <a:p>
             <a:fld id="{9C191E7F-DEE6-484A-A82C-BAFF244F7279}" type="datetime1">
-              <a:t>10/8/25</a:t>
+              <a:t>10/19/25</a:t>
             </a:fld>
             <a:endParaRPr lang="en-US"/>
           </a:p>
@@ -3059,7 +3059,7 @@
           <a:lstStyle/>
           <a:p>
             <a:fld id="{28729F24-D603-3E4E-B9DD-B204C7317137}" type="datetime1">
-              <a:t>10/8/25</a:t>
+              <a:t>10/19/25</a:t>
             </a:fld>
             <a:endParaRPr lang="en-US"/>
           </a:p>
@@ -3174,7 +3174,7 @@
           <a:lstStyle/>
           <a:p>
             <a:fld id="{653182AB-9B14-5F4A-B96C-4542C0609F01}" type="datetime1">
-              <a:t>10/8/25</a:t>
+              <a:t>10/19/25</a:t>
             </a:fld>
             <a:endParaRPr lang="en-US"/>
           </a:p>
@@ -3487,7 +3487,7 @@
           <a:lstStyle/>
           <a:p>
             <a:fld id="{E06CFFB9-FD44-0143-82C5-319D18BA6C1A}" type="datetime1">
-              <a:t>10/8/25</a:t>
+              <a:t>10/19/25</a:t>
             </a:fld>
             <a:endParaRPr lang="en-US"/>
           </a:p>
@@ -3777,7 +3777,7 @@
           <a:lstStyle/>
           <a:p>
             <a:fld id="{AD378748-6546-7942-AB14-9B6D53E5D93C}" type="datetime1">
-              <a:t>10/8/25</a:t>
+              <a:t>10/19/25</a:t>
             </a:fld>
             <a:endParaRPr lang="en-US"/>
           </a:p>
@@ -4020,7 +4020,7 @@
           </a:lstStyle>
           <a:p>
             <a:fld id="{B8C141C7-3FAC-3945-B604-870AABF28252}" type="datetime1">
-              <a:t>10/8/25</a:t>
+              <a:t>10/19/25</a:t>
             </a:fld>
             <a:endParaRPr lang="en-US"/>
           </a:p>
@@ -5411,9 +5411,9 @@
         <p:grpSpPr>
           <a:xfrm>
             <a:off x="307739" y="3561870"/>
-            <a:ext cx="4693816" cy="3296130"/>
+            <a:ext cx="4693816" cy="3298400"/>
             <a:chOff x="307739" y="3561870"/>
-            <a:chExt cx="4693816" cy="3296130"/>
+            <a:chExt cx="4693816" cy="3298400"/>
           </a:xfrm>
         </p:grpSpPr>
         <p:grpSp>
@@ -5431,9 +5431,9 @@
           <p:grpSpPr>
             <a:xfrm>
               <a:off x="307739" y="3561870"/>
-              <a:ext cx="4693816" cy="3286575"/>
+              <a:ext cx="4693816" cy="3298400"/>
               <a:chOff x="307739" y="3561870"/>
-              <a:chExt cx="4693816" cy="3286575"/>
+              <a:chExt cx="4693816" cy="3298400"/>
             </a:xfrm>
           </p:grpSpPr>
           <p:sp>
@@ -6853,8 +6853,8 @@
             </p:nvSpPr>
             <p:spPr>
               <a:xfrm>
-                <a:off x="1515808" y="5843427"/>
-                <a:ext cx="397866" cy="215444"/>
+                <a:off x="1431650" y="5870184"/>
+                <a:ext cx="566181" cy="215444"/>
               </a:xfrm>
               <a:prstGeom prst="rect">
                 <a:avLst/>
@@ -6869,7 +6869,7 @@
               <a:p>
                 <a:r>
                   <a:rPr lang="en-US" sz="800"/>
-                  <a:t>100k</a:t>
+                  <a:t>1237230</a:t>
                 </a:r>
               </a:p>
             </p:txBody>
@@ -6888,8 +6888,8 @@
             </p:nvSpPr>
             <p:spPr>
               <a:xfrm>
-                <a:off x="336775" y="6633001"/>
-                <a:ext cx="343364" cy="215444"/>
+                <a:off x="325300" y="6644826"/>
+                <a:ext cx="457176" cy="215444"/>
               </a:xfrm>
               <a:prstGeom prst="rect">
                 <a:avLst/>
@@ -6904,7 +6904,7 @@
               <a:p>
                 <a:r>
                   <a:rPr lang="en-US" sz="800"/>
-                  <a:t>20k</a:t>
+                  <a:t>20984</a:t>
                 </a:r>
               </a:p>
             </p:txBody>
@@ -6923,8 +6923,8 @@
             </p:nvSpPr>
             <p:spPr>
               <a:xfrm>
-                <a:off x="1207035" y="6633001"/>
-                <a:ext cx="343364" cy="215444"/>
+                <a:off x="1170073" y="6642556"/>
+                <a:ext cx="457176" cy="215444"/>
               </a:xfrm>
               <a:prstGeom prst="rect">
                 <a:avLst/>
@@ -6939,7 +6939,7 @@
               <a:p>
                 <a:r>
                   <a:rPr lang="en-US" sz="800"/>
-                  <a:t>10k</a:t>
+                  <a:t>10017</a:t>
                 </a:r>
               </a:p>
             </p:txBody>
@@ -6958,8 +6958,8 @@
             </p:nvSpPr>
             <p:spPr>
               <a:xfrm>
-                <a:off x="2505883" y="6633001"/>
-                <a:ext cx="343364" cy="215444"/>
+                <a:off x="2449177" y="6642556"/>
+                <a:ext cx="457176" cy="215444"/>
               </a:xfrm>
               <a:prstGeom prst="rect">
                 <a:avLst/>
@@ -6974,7 +6974,7 @@
               <a:p>
                 <a:r>
                   <a:rPr lang="en-US" sz="800"/>
-                  <a:t>25k</a:t>
+                  <a:t>25338</a:t>
                 </a:r>
               </a:p>
             </p:txBody>
@@ -6994,8 +6994,8 @@
           </p:nvSpPr>
           <p:spPr>
             <a:xfrm>
-              <a:off x="3277880" y="6642556"/>
-              <a:ext cx="343364" cy="215444"/>
+              <a:off x="3225250" y="6644826"/>
+              <a:ext cx="457176" cy="215444"/>
             </a:xfrm>
             <a:prstGeom prst="rect">
               <a:avLst/>
@@ -7010,7 +7010,7 @@
             <a:p>
               <a:r>
                 <a:rPr lang="en-US" sz="800"/>
-                <a:t>50k</a:t>
+                <a:t>50110</a:t>
               </a:r>
             </a:p>
           </p:txBody>
@@ -7895,7 +7895,7 @@
         <p:spPr>
           <a:xfrm>
             <a:off x="468085" y="326572"/>
-            <a:ext cx="3502113" cy="338554"/>
+            <a:ext cx="2495811" cy="338554"/>
           </a:xfrm>
           <a:prstGeom prst="rect">
             <a:avLst/>
@@ -7910,7 +7910,7 @@
           <a:p>
             <a:r>
               <a:rPr lang="en-US" sz="1600"/>
-              <a:t>Decorator – Let’s write a “real du” tool</a:t>
+              <a:t>Decorator – Scale the size</a:t>
             </a:r>
           </a:p>
         </p:txBody>
@@ -7930,7 +7930,7 @@
         <p:spPr>
           <a:xfrm>
             <a:off x="1152512" y="793203"/>
-            <a:ext cx="3717684" cy="1754326"/>
+            <a:ext cx="3345788" cy="1754326"/>
           </a:xfrm>
           <a:prstGeom prst="rect">
             <a:avLst/>
@@ -7953,14 +7953,14 @@
                 <a:latin typeface="Courier New" panose="02070309020205020404" pitchFamily="49" charset="0"/>
                 <a:cs typeface="Courier New" panose="02070309020205020404" pitchFamily="49" charset="0"/>
               </a:rPr>
-              <a:t>class Real</a:t>
+              <a:t>class KiloSize</a:t>
             </a:r>
             <a:r>
               <a:rPr lang="en-US" sz="1200" dirty="0" err="1">
                 <a:latin typeface="Courier New" panose="02070309020205020404" pitchFamily="49" charset="0"/>
                 <a:cs typeface="Courier New" panose="02070309020205020404" pitchFamily="49" charset="0"/>
               </a:rPr>
-              <a:t>DiskItem : public DiskItem</a:t>
+              <a:t> : public DiskItem</a:t>
             </a:r>
             <a:r>
               <a:rPr lang="en-US" sz="1200" dirty="0">
@@ -7985,21 +7985,7 @@
                 <a:latin typeface="Courier New" panose="02070309020205020404" pitchFamily="49" charset="0"/>
                 <a:cs typeface="Courier New" panose="02070309020205020404" pitchFamily="49" charset="0"/>
               </a:rPr>
-              <a:t>  Real</a:t>
-            </a:r>
-            <a:r>
-              <a:rPr lang="en-US" sz="1200" dirty="0" err="1">
-                <a:latin typeface="Courier New" panose="02070309020205020404" pitchFamily="49" charset="0"/>
-                <a:cs typeface="Courier New" panose="02070309020205020404" pitchFamily="49" charset="0"/>
-              </a:rPr>
-              <a:t>DiskItem</a:t>
-            </a:r>
-            <a:r>
-              <a:rPr lang="en-US" sz="1200" dirty="0">
-                <a:latin typeface="Courier New" panose="02070309020205020404" pitchFamily="49" charset="0"/>
-                <a:cs typeface="Courier New" panose="02070309020205020404" pitchFamily="49" charset="0"/>
-              </a:rPr>
-              <a:t>(</a:t>
+              <a:t>  KiloSize(</a:t>
             </a:r>
             <a:r>
               <a:rPr lang="en-US" sz="1200" dirty="0" err="1">
@@ -8081,7 +8067,7 @@
         <p:spPr>
           <a:xfrm>
             <a:off x="6096000" y="2318545"/>
-            <a:ext cx="4461478" cy="1569660"/>
+            <a:ext cx="3717684" cy="3600986"/>
           </a:xfrm>
           <a:prstGeom prst="rect">
             <a:avLst/>
@@ -8099,35 +8085,21 @@
                 <a:latin typeface="Courier New" panose="02070309020205020404" pitchFamily="49" charset="0"/>
                 <a:cs typeface="Courier New" panose="02070309020205020404" pitchFamily="49" charset="0"/>
               </a:rPr>
-              <a:t>Real</a:t>
+              <a:t>KiloSize</a:t>
             </a:r>
             <a:r>
               <a:rPr lang="en-US" sz="1200" dirty="0" err="1">
                 <a:latin typeface="Courier New" panose="02070309020205020404" pitchFamily="49" charset="0"/>
                 <a:cs typeface="Courier New" panose="02070309020205020404" pitchFamily="49" charset="0"/>
               </a:rPr>
-              <a:t>DiskItem </a:t>
+              <a:t> </a:t>
             </a:r>
             <a:r>
               <a:rPr lang="en-US" sz="1200" dirty="0">
                 <a:latin typeface="Courier New" panose="02070309020205020404" pitchFamily="49" charset="0"/>
                 <a:cs typeface="Courier New" panose="02070309020205020404" pitchFamily="49" charset="0"/>
               </a:rPr>
-              <a:t>:: Real</a:t>
-            </a:r>
-            <a:r>
-              <a:rPr lang="en-US" sz="1200" dirty="0" err="1">
-                <a:latin typeface="Courier New" panose="02070309020205020404" pitchFamily="49" charset="0"/>
-                <a:cs typeface="Courier New" panose="02070309020205020404" pitchFamily="49" charset="0"/>
-              </a:rPr>
-              <a:t>DiskItem</a:t>
-            </a:r>
-            <a:r>
-              <a:rPr lang="en-US" sz="1200" dirty="0">
-                <a:latin typeface="Courier New" panose="02070309020205020404" pitchFamily="49" charset="0"/>
-                <a:cs typeface="Courier New" panose="02070309020205020404" pitchFamily="49" charset="0"/>
-              </a:rPr>
-              <a:t>(</a:t>
+              <a:t>:: KiloSize(</a:t>
             </a:r>
             <a:r>
               <a:rPr lang="en-US" sz="1200" dirty="0" err="1">
@@ -8174,7 +8146,7 @@
                 <a:latin typeface="Courier New" panose="02070309020205020404" pitchFamily="49" charset="0"/>
                 <a:cs typeface="Courier New" panose="02070309020205020404" pitchFamily="49" charset="0"/>
               </a:rPr>
-              <a:t>size_t DiskItem::size() {</a:t>
+              <a:t>size_t KiloSize::size() {</a:t>
             </a:r>
           </a:p>
           <a:p>
@@ -8183,7 +8155,7 @@
                 <a:latin typeface="Courier New" panose="02070309020205020404" pitchFamily="49" charset="0"/>
                 <a:cs typeface="Courier New" panose="02070309020205020404" pitchFamily="49" charset="0"/>
               </a:rPr>
-              <a:t>  return item-&gt;_stat.st_mode &amp; S_IFREG ?</a:t>
+              <a:t>  return _item-&gt;size() / 1024;</a:t>
             </a:r>
           </a:p>
           <a:p>
@@ -8192,8 +8164,26 @@
                 <a:latin typeface="Courier New" panose="02070309020205020404" pitchFamily="49" charset="0"/>
                 <a:cs typeface="Courier New" panose="02070309020205020404" pitchFamily="49" charset="0"/>
               </a:rPr>
-              <a:t>    item-&gt;_stat.st_blocks : _item-&gt;size();</a:t>
-            </a:r>
+              <a:t>}</a:t>
+            </a:r>
+          </a:p>
+          <a:p>
+            <a:endParaRPr lang="en-US" sz="1200" dirty="0">
+              <a:latin typeface="Courier New" panose="02070309020205020404" pitchFamily="49" charset="0"/>
+              <a:cs typeface="Courier New" panose="02070309020205020404" pitchFamily="49" charset="0"/>
+            </a:endParaRPr>
+          </a:p>
+          <a:p>
+            <a:endParaRPr lang="en-US" sz="1200" dirty="0">
+              <a:latin typeface="Courier New" panose="02070309020205020404" pitchFamily="49" charset="0"/>
+              <a:cs typeface="Courier New" panose="02070309020205020404" pitchFamily="49" charset="0"/>
+            </a:endParaRPr>
+          </a:p>
+          <a:p>
+            <a:endParaRPr lang="en-US" sz="1200" dirty="0">
+              <a:latin typeface="Courier New" panose="02070309020205020404" pitchFamily="49" charset="0"/>
+              <a:cs typeface="Courier New" panose="02070309020205020404" pitchFamily="49" charset="0"/>
+            </a:endParaRPr>
           </a:p>
           <a:p>
             <a:r>
@@ -8201,7 +8191,70 @@
                 <a:latin typeface="Courier New" panose="02070309020205020404" pitchFamily="49" charset="0"/>
                 <a:cs typeface="Courier New" panose="02070309020205020404" pitchFamily="49" charset="0"/>
               </a:rPr>
-              <a:t>}</a:t>
+              <a:t>DiskItem item(“/home/backup.tar”);</a:t>
+            </a:r>
+          </a:p>
+          <a:p>
+            <a:endParaRPr lang="en-US" sz="1200" dirty="0">
+              <a:latin typeface="Courier New" panose="02070309020205020404" pitchFamily="49" charset="0"/>
+              <a:cs typeface="Courier New" panose="02070309020205020404" pitchFamily="49" charset="0"/>
+            </a:endParaRPr>
+          </a:p>
+          <a:p>
+            <a:r>
+              <a:rPr lang="en-US" sz="1200" dirty="0">
+                <a:latin typeface="Courier New" panose="02070309020205020404" pitchFamily="49" charset="0"/>
+                <a:cs typeface="Courier New" panose="02070309020205020404" pitchFamily="49" charset="0"/>
+              </a:rPr>
+              <a:t>cout &lt;&lt; item.size() // 1237230 bytes</a:t>
+            </a:r>
+          </a:p>
+          <a:p>
+            <a:endParaRPr lang="en-US" sz="1200" dirty="0">
+              <a:latin typeface="Courier New" panose="02070309020205020404" pitchFamily="49" charset="0"/>
+              <a:cs typeface="Courier New" panose="02070309020205020404" pitchFamily="49" charset="0"/>
+            </a:endParaRPr>
+          </a:p>
+          <a:p>
+            <a:r>
+              <a:rPr lang="en-US" sz="1200" dirty="0">
+                <a:latin typeface="Courier New" panose="02070309020205020404" pitchFamily="49" charset="0"/>
+                <a:cs typeface="Courier New" panose="02070309020205020404" pitchFamily="49" charset="0"/>
+              </a:rPr>
+              <a:t>KiloSize kbytes(&amp;item);</a:t>
+            </a:r>
+          </a:p>
+          <a:p>
+            <a:r>
+              <a:rPr lang="en-US" sz="1200" dirty="0">
+                <a:latin typeface="Courier New" panose="02070309020205020404" pitchFamily="49" charset="0"/>
+                <a:cs typeface="Courier New" panose="02070309020205020404" pitchFamily="49" charset="0"/>
+              </a:rPr>
+              <a:t>cout &lt;&lt; kbytes.size() // 1208 Kbytes</a:t>
+            </a:r>
+          </a:p>
+          <a:p>
+            <a:endParaRPr lang="en-US" sz="1200" dirty="0">
+              <a:latin typeface="Courier New" panose="02070309020205020404" pitchFamily="49" charset="0"/>
+              <a:cs typeface="Courier New" panose="02070309020205020404" pitchFamily="49" charset="0"/>
+            </a:endParaRPr>
+          </a:p>
+          <a:p>
+            <a:r>
+              <a:rPr lang="en-US" sz="1200" dirty="0">
+                <a:latin typeface="Courier New" panose="02070309020205020404" pitchFamily="49" charset="0"/>
+                <a:cs typeface="Courier New" panose="02070309020205020404" pitchFamily="49" charset="0"/>
+              </a:rPr>
+              <a:t>KiloSize mbytes(&amp;kbytes);</a:t>
+            </a:r>
+          </a:p>
+          <a:p>
+            <a:r>
+              <a:rPr lang="en-US" sz="1200" dirty="0">
+                <a:latin typeface="Courier New" panose="02070309020205020404" pitchFamily="49" charset="0"/>
+                <a:cs typeface="Courier New" panose="02070309020205020404" pitchFamily="49" charset="0"/>
+              </a:rPr>
+              <a:t>cout &lt;&lt; mbytes.size() // 1 Mbyte</a:t>
             </a:r>
           </a:p>
         </p:txBody>
@@ -9629,216 +9682,6 @@
             </a:fontRef>
           </p:style>
         </p:cxnSp>
-        <p:sp>
-          <p:nvSpPr>
-            <p:cNvPr id="68" name="TextBox 67">
-              <a:extLst>
-                <a:ext uri="{FF2B5EF4-FFF2-40B4-BE49-F238E27FC236}">
-                  <a16:creationId xmlns:a16="http://schemas.microsoft.com/office/drawing/2014/main" id="{A076826B-20C4-44EB-5231-B7D6372C8BA2}"/>
-                </a:ext>
-              </a:extLst>
-            </p:cNvPr>
-            <p:cNvSpPr txBox="1"/>
-            <p:nvPr/>
-          </p:nvSpPr>
-          <p:spPr>
-            <a:xfrm>
-              <a:off x="1566985" y="4586995"/>
-              <a:ext cx="397866" cy="215444"/>
-            </a:xfrm>
-            <a:prstGeom prst="rect">
-              <a:avLst/>
-            </a:prstGeom>
-            <a:noFill/>
-          </p:spPr>
-          <p:txBody>
-            <a:bodyPr wrap="none" rtlCol="0">
-              <a:spAutoFit/>
-            </a:bodyPr>
-            <a:lstStyle/>
-            <a:p>
-              <a:r>
-                <a:rPr lang="en-US" sz="800">
-                  <a:solidFill>
-                    <a:schemeClr val="tx1">
-                      <a:lumMod val="50000"/>
-                      <a:lumOff val="50000"/>
-                    </a:schemeClr>
-                  </a:solidFill>
-                </a:rPr>
-                <a:t>100k</a:t>
-              </a:r>
-            </a:p>
-          </p:txBody>
-        </p:sp>
-        <p:sp>
-          <p:nvSpPr>
-            <p:cNvPr id="69" name="TextBox 68">
-              <a:extLst>
-                <a:ext uri="{FF2B5EF4-FFF2-40B4-BE49-F238E27FC236}">
-                  <a16:creationId xmlns:a16="http://schemas.microsoft.com/office/drawing/2014/main" id="{C086A5F1-CF3C-8142-65AE-E226A9917B90}"/>
-                </a:ext>
-              </a:extLst>
-            </p:cNvPr>
-            <p:cNvSpPr txBox="1"/>
-            <p:nvPr/>
-          </p:nvSpPr>
-          <p:spPr>
-            <a:xfrm>
-              <a:off x="419883" y="5406231"/>
-              <a:ext cx="343364" cy="215444"/>
-            </a:xfrm>
-            <a:prstGeom prst="rect">
-              <a:avLst/>
-            </a:prstGeom>
-            <a:noFill/>
-          </p:spPr>
-          <p:txBody>
-            <a:bodyPr wrap="none" rtlCol="0">
-              <a:spAutoFit/>
-            </a:bodyPr>
-            <a:lstStyle/>
-            <a:p>
-              <a:r>
-                <a:rPr lang="en-US" sz="800">
-                  <a:solidFill>
-                    <a:schemeClr val="tx1">
-                      <a:lumMod val="50000"/>
-                      <a:lumOff val="50000"/>
-                    </a:schemeClr>
-                  </a:solidFill>
-                </a:rPr>
-                <a:t>20k</a:t>
-              </a:r>
-            </a:p>
-          </p:txBody>
-        </p:sp>
-        <p:sp>
-          <p:nvSpPr>
-            <p:cNvPr id="70" name="TextBox 69">
-              <a:extLst>
-                <a:ext uri="{FF2B5EF4-FFF2-40B4-BE49-F238E27FC236}">
-                  <a16:creationId xmlns:a16="http://schemas.microsoft.com/office/drawing/2014/main" id="{6B7CF4BA-305A-3A74-D42D-FBE19BC0FFCE}"/>
-                </a:ext>
-              </a:extLst>
-            </p:cNvPr>
-            <p:cNvSpPr txBox="1"/>
-            <p:nvPr/>
-          </p:nvSpPr>
-          <p:spPr>
-            <a:xfrm>
-              <a:off x="1266980" y="5406231"/>
-              <a:ext cx="343364" cy="215444"/>
-            </a:xfrm>
-            <a:prstGeom prst="rect">
-              <a:avLst/>
-            </a:prstGeom>
-            <a:noFill/>
-          </p:spPr>
-          <p:txBody>
-            <a:bodyPr wrap="none" rtlCol="0">
-              <a:spAutoFit/>
-            </a:bodyPr>
-            <a:lstStyle/>
-            <a:p>
-              <a:r>
-                <a:rPr lang="en-US" sz="800">
-                  <a:solidFill>
-                    <a:schemeClr val="tx1">
-                      <a:lumMod val="50000"/>
-                      <a:lumOff val="50000"/>
-                    </a:schemeClr>
-                  </a:solidFill>
-                </a:rPr>
-                <a:t>10k</a:t>
-              </a:r>
-            </a:p>
-          </p:txBody>
-        </p:sp>
-        <p:sp>
-          <p:nvSpPr>
-            <p:cNvPr id="71" name="TextBox 70">
-              <a:extLst>
-                <a:ext uri="{FF2B5EF4-FFF2-40B4-BE49-F238E27FC236}">
-                  <a16:creationId xmlns:a16="http://schemas.microsoft.com/office/drawing/2014/main" id="{A2C61D39-E95A-0682-CA90-C04342A4A419}"/>
-                </a:ext>
-              </a:extLst>
-            </p:cNvPr>
-            <p:cNvSpPr txBox="1"/>
-            <p:nvPr/>
-          </p:nvSpPr>
-          <p:spPr>
-            <a:xfrm>
-              <a:off x="2557839" y="5406934"/>
-              <a:ext cx="343364" cy="215444"/>
-            </a:xfrm>
-            <a:prstGeom prst="rect">
-              <a:avLst/>
-            </a:prstGeom>
-            <a:noFill/>
-          </p:spPr>
-          <p:txBody>
-            <a:bodyPr wrap="none" rtlCol="0">
-              <a:spAutoFit/>
-            </a:bodyPr>
-            <a:lstStyle/>
-            <a:p>
-              <a:r>
-                <a:rPr lang="en-US" sz="800">
-                  <a:solidFill>
-                    <a:schemeClr val="tx1">
-                      <a:lumMod val="50000"/>
-                      <a:lumOff val="50000"/>
-                    </a:schemeClr>
-                  </a:solidFill>
-                </a:rPr>
-                <a:t>25k</a:t>
-              </a:r>
-            </a:p>
-          </p:txBody>
-        </p:sp>
-        <p:sp>
-          <p:nvSpPr>
-            <p:cNvPr id="72" name="TextBox 71">
-              <a:extLst>
-                <a:ext uri="{FF2B5EF4-FFF2-40B4-BE49-F238E27FC236}">
-                  <a16:creationId xmlns:a16="http://schemas.microsoft.com/office/drawing/2014/main" id="{E7B00ACA-A2EF-2320-E251-89AFEDDBAD06}"/>
-                </a:ext>
-              </a:extLst>
-            </p:cNvPr>
-            <p:cNvSpPr txBox="1"/>
-            <p:nvPr/>
-          </p:nvSpPr>
-          <p:spPr>
-            <a:xfrm>
-              <a:off x="3350185" y="5406231"/>
-              <a:ext cx="343364" cy="215444"/>
-            </a:xfrm>
-            <a:prstGeom prst="rect">
-              <a:avLst/>
-            </a:prstGeom>
-            <a:noFill/>
-          </p:spPr>
-          <p:txBody>
-            <a:bodyPr wrap="none" rtlCol="0">
-              <a:spAutoFit/>
-            </a:bodyPr>
-            <a:lstStyle/>
-            <a:p>
-              <a:r>
-                <a:rPr lang="en-US" sz="800">
-                  <a:solidFill>
-                    <a:schemeClr val="tx1">
-                      <a:lumMod val="50000"/>
-                      <a:lumOff val="50000"/>
-                    </a:schemeClr>
-                  </a:solidFill>
-                </a:rPr>
-                <a:t>50k</a:t>
-              </a:r>
-            </a:p>
-          </p:txBody>
-        </p:sp>
         <p:sp>
           <p:nvSpPr>
             <p:cNvPr id="4" name="Oval 3">
@@ -19771,7 +19614,7 @@
                 <a:latin typeface="Courier New" panose="02070309020205020404" pitchFamily="49" charset="0"/>
                 <a:cs typeface="Courier New" panose="02070309020205020404" pitchFamily="49" charset="0"/>
               </a:rPr>
-              <a:t>    t-&gt;getOrigin(bottom, left);</a:t>
+              <a:t>    _text-&gt;getOrigin(bottom, left);</a:t>
             </a:r>
           </a:p>
           <a:p>
@@ -19780,7 +19623,7 @@
                 <a:latin typeface="Courier New" panose="02070309020205020404" pitchFamily="49" charset="0"/>
                 <a:cs typeface="Courier New" panose="02070309020205020404" pitchFamily="49" charset="0"/>
               </a:rPr>
-              <a:t>    t-&gt;getExtent(width, height);</a:t>
+              <a:t>    _text-&gt;getExtent(width, height);</a:t>
             </a:r>
           </a:p>
           <a:p>
@@ -19837,7 +19680,7 @@
                 <a:latin typeface="Courier New" panose="02070309020205020404" pitchFamily="49" charset="0"/>
                 <a:cs typeface="Courier New" panose="02070309020205020404" pitchFamily="49" charset="0"/>
               </a:rPr>
-              <a:t>    return _t-&gt;isEmpty();</a:t>
+              <a:t>    return _text-&gt;isEmpty();</a:t>
             </a:r>
           </a:p>
           <a:p>
@@ -21305,7 +21148,7 @@
         </p:nvSpPr>
         <p:spPr>
           <a:xfrm>
-            <a:off x="425858" y="3863360"/>
+            <a:off x="461453" y="3913586"/>
             <a:ext cx="4368504" cy="2123658"/>
           </a:xfrm>
           <a:prstGeom prst="rect">
@@ -21446,8 +21289,8 @@
         </p:nvCxnSpPr>
         <p:spPr>
           <a:xfrm rot="5400000" flipH="1" flipV="1">
-            <a:off x="3134188" y="2764650"/>
-            <a:ext cx="574632" cy="1622788"/>
+            <a:off x="3126872" y="2807561"/>
+            <a:ext cx="624858" cy="1587193"/>
           </a:xfrm>
           <a:prstGeom prst="bentConnector3">
             <a:avLst/>

</xml_diff>